<commit_message>
Review 2 Docs PPT Updated
</commit_message>
<xml_diff>
--- a/Presentations/Decentralized Application for Digital Certification.pptx
+++ b/Presentations/Decentralized Application for Digital Certification.pptx
@@ -141,6 +141,10 @@
 </p:presentation>
 </file>
 
+<file path=ppt/revisionInfo.xml><?xml version="1.0" encoding="utf-8"?>
+<p1510:revInfo xmlns:a="http://schemas.openxmlformats.org/drawingml/2006/main" xmlns:r="http://schemas.openxmlformats.org/officeDocument/2006/relationships" xmlns:p1510="http://schemas.microsoft.com/office/powerpoint/2015/10/main"/>
+</file>
+
 <file path=ppt/handoutMasters/handoutMaster1.xml><?xml version="1.0" encoding="utf-8"?>
 <p:handoutMaster xmlns:a="http://schemas.openxmlformats.org/drawingml/2006/main" xmlns:r="http://schemas.openxmlformats.org/officeDocument/2006/relationships" xmlns:p="http://schemas.openxmlformats.org/presentationml/2006/main">
   <p:cSld>
@@ -223,7 +227,8 @@
           <a:p>
             <a:fld id="{59088EAF-6ECA-4616-85EF-35AA19C641F3}" type="datetimeFigureOut">
               <a:rPr lang="en-US"/>
-              <a:t>9/19/2017</a:t>
+              <a:pPr/>
+              <a:t>11/20/2017</a:t>
             </a:fld>
             <a:endParaRPr/>
           </a:p>
@@ -289,6 +294,7 @@
           <a:p>
             <a:fld id="{D9F912AB-2776-42F2-A957-313FC7EFEDB9}" type="slidenum">
               <a:rPr/>
+              <a:pPr/>
               <a:t>‹#›</a:t>
             </a:fld>
             <a:endParaRPr/>
@@ -388,7 +394,8 @@
           <a:p>
             <a:fld id="{3ABD2D7A-D230-4F91-BD59-0A39C2703BA8}" type="datetimeFigureOut">
               <a:rPr lang="en-US"/>
-              <a:t>9/19/2017</a:t>
+              <a:pPr/>
+              <a:t>11/20/2017</a:t>
             </a:fld>
             <a:endParaRPr/>
           </a:p>
@@ -541,6 +548,7 @@
           <a:p>
             <a:fld id="{F93199CD-3E1B-4AE6-990F-76F925F5EA9F}" type="slidenum">
               <a:rPr/>
+              <a:pPr/>
               <a:t>‹#›</a:t>
             </a:fld>
             <a:endParaRPr/>
@@ -656,7 +664,7 @@
     <p:bg>
       <p:bgPr>
         <a:blipFill dpi="0" rotWithShape="1">
-          <a:blip r:embed="rId2">
+          <a:blip r:embed="rId2" cstate="print">
             <a:lum/>
           </a:blip>
           <a:srcRect/>
@@ -997,7 +1005,8 @@
           <a:p>
             <a:fld id="{03F41C87-7AD9-4845-A077-840E4A0F3F06}" type="datetimeFigureOut">
               <a:rPr lang="en-US"/>
-              <a:t>9/19/2017</a:t>
+              <a:pPr/>
+              <a:t>11/20/2017</a:t>
             </a:fld>
             <a:endParaRPr/>
           </a:p>
@@ -1020,6 +1029,7 @@
           <a:p>
             <a:fld id="{2A013F82-EE5E-44EE-A61D-E31C6657F26F}" type="slidenum">
               <a:rPr/>
+              <a:pPr/>
               <a:t>‹#›</a:t>
             </a:fld>
             <a:endParaRPr/>
@@ -1189,7 +1199,8 @@
           <a:p>
             <a:fld id="{03F41C87-7AD9-4845-A077-840E4A0F3F06}" type="datetimeFigureOut">
               <a:rPr lang="en-US"/>
-              <a:t>9/19/2017</a:t>
+              <a:pPr/>
+              <a:t>11/20/2017</a:t>
             </a:fld>
             <a:endParaRPr/>
           </a:p>
@@ -1212,6 +1223,7 @@
           <a:p>
             <a:fld id="{2A013F82-EE5E-44EE-A61D-E31C6657F26F}" type="slidenum">
               <a:rPr/>
+              <a:pPr/>
               <a:t>‹#›</a:t>
             </a:fld>
             <a:endParaRPr/>
@@ -1378,7 +1390,8 @@
           <a:p>
             <a:fld id="{03F41C87-7AD9-4845-A077-840E4A0F3F06}" type="datetimeFigureOut">
               <a:rPr lang="en-US"/>
-              <a:t>9/19/2017</a:t>
+              <a:pPr/>
+              <a:t>11/20/2017</a:t>
             </a:fld>
             <a:endParaRPr/>
           </a:p>
@@ -1401,6 +1414,7 @@
           <a:p>
             <a:fld id="{2A013F82-EE5E-44EE-A61D-E31C6657F26F}" type="slidenum">
               <a:rPr/>
+              <a:pPr/>
               <a:t>‹#›</a:t>
             </a:fld>
             <a:endParaRPr/>
@@ -1438,7 +1452,7 @@
     <p:bg>
       <p:bgPr>
         <a:blipFill dpi="0" rotWithShape="1">
-          <a:blip r:embed="rId2">
+          <a:blip r:embed="rId2" cstate="print">
             <a:lum/>
           </a:blip>
           <a:srcRect/>
@@ -1658,7 +1672,8 @@
           <a:p>
             <a:fld id="{03F41C87-7AD9-4845-A077-840E4A0F3F06}" type="datetimeFigureOut">
               <a:rPr lang="en-US"/>
-              <a:t>9/19/2017</a:t>
+              <a:pPr/>
+              <a:t>11/20/2017</a:t>
             </a:fld>
             <a:endParaRPr/>
           </a:p>
@@ -1681,6 +1696,7 @@
           <a:p>
             <a:fld id="{2A013F82-EE5E-44EE-A61D-E31C6657F26F}" type="slidenum">
               <a:rPr/>
+              <a:pPr/>
               <a:t>‹#›</a:t>
             </a:fld>
             <a:endParaRPr/>
@@ -1962,7 +1978,8 @@
           <a:p>
             <a:fld id="{03F41C87-7AD9-4845-A077-840E4A0F3F06}" type="datetimeFigureOut">
               <a:rPr lang="en-US"/>
-              <a:t>9/19/2017</a:t>
+              <a:pPr/>
+              <a:t>11/20/2017</a:t>
             </a:fld>
             <a:endParaRPr/>
           </a:p>
@@ -1985,6 +2002,7 @@
           <a:p>
             <a:fld id="{2A013F82-EE5E-44EE-A61D-E31C6657F26F}" type="slidenum">
               <a:rPr/>
+              <a:pPr/>
               <a:t>‹#›</a:t>
             </a:fld>
             <a:endParaRPr/>
@@ -2418,7 +2436,8 @@
           <a:p>
             <a:fld id="{03F41C87-7AD9-4845-A077-840E4A0F3F06}" type="datetimeFigureOut">
               <a:rPr lang="en-US"/>
-              <a:t>9/19/2017</a:t>
+              <a:pPr/>
+              <a:t>11/20/2017</a:t>
             </a:fld>
             <a:endParaRPr/>
           </a:p>
@@ -2441,6 +2460,7 @@
           <a:p>
             <a:fld id="{2A013F82-EE5E-44EE-A61D-E31C6657F26F}" type="slidenum">
               <a:rPr/>
+              <a:pPr/>
               <a:t>‹#›</a:t>
             </a:fld>
             <a:endParaRPr/>
@@ -2548,7 +2568,8 @@
           <a:p>
             <a:fld id="{03F41C87-7AD9-4845-A077-840E4A0F3F06}" type="datetimeFigureOut">
               <a:rPr lang="en-US"/>
-              <a:t>9/19/2017</a:t>
+              <a:pPr/>
+              <a:t>11/20/2017</a:t>
             </a:fld>
             <a:endParaRPr/>
           </a:p>
@@ -2571,6 +2592,7 @@
           <a:p>
             <a:fld id="{2A013F82-EE5E-44EE-A61D-E31C6657F26F}" type="slidenum">
               <a:rPr/>
+              <a:pPr/>
               <a:t>‹#›</a:t>
             </a:fld>
             <a:endParaRPr/>
@@ -2663,7 +2685,8 @@
           <a:p>
             <a:fld id="{03F41C87-7AD9-4845-A077-840E4A0F3F06}" type="datetimeFigureOut">
               <a:rPr lang="en-US"/>
-              <a:t>9/19/2017</a:t>
+              <a:pPr/>
+              <a:t>11/20/2017</a:t>
             </a:fld>
             <a:endParaRPr/>
           </a:p>
@@ -2686,6 +2709,7 @@
           <a:p>
             <a:fld id="{2A013F82-EE5E-44EE-A61D-E31C6657F26F}" type="slidenum">
               <a:rPr/>
+              <a:pPr/>
               <a:t>‹#›</a:t>
             </a:fld>
             <a:endParaRPr/>
@@ -2723,7 +2747,7 @@
     <p:bg>
       <p:bgPr>
         <a:blipFill dpi="0" rotWithShape="1">
-          <a:blip r:embed="rId2">
+          <a:blip r:embed="rId2" cstate="print">
             <a:lum/>
           </a:blip>
           <a:srcRect/>
@@ -2985,7 +3009,8 @@
           <a:p>
             <a:fld id="{03F41C87-7AD9-4845-A077-840E4A0F3F06}" type="datetimeFigureOut">
               <a:rPr lang="en-US"/>
-              <a:t>9/19/2017</a:t>
+              <a:pPr/>
+              <a:t>11/20/2017</a:t>
             </a:fld>
             <a:endParaRPr/>
           </a:p>
@@ -3008,6 +3033,7 @@
           <a:p>
             <a:fld id="{2A013F82-EE5E-44EE-A61D-E31C6657F26F}" type="slidenum">
               <a:rPr/>
+              <a:pPr/>
               <a:t>‹#›</a:t>
             </a:fld>
             <a:endParaRPr/>
@@ -3045,7 +3071,7 @@
     <p:bg>
       <p:bgPr>
         <a:blipFill dpi="0" rotWithShape="1">
-          <a:blip r:embed="rId2">
+          <a:blip r:embed="rId2" cstate="print">
             <a:lum/>
           </a:blip>
           <a:srcRect/>
@@ -3297,7 +3323,7 @@
             <a:fld id="{03F41C87-7AD9-4845-A077-840E4A0F3F06}" type="datetimeFigureOut">
               <a:rPr lang="en-US"/>
               <a:pPr/>
-              <a:t>9/19/2017</a:t>
+              <a:t>11/20/2017</a:t>
             </a:fld>
             <a:endParaRPr/>
           </a:p>
@@ -3358,7 +3384,7 @@
     <p:bg>
       <p:bgPr>
         <a:blipFill dpi="0" rotWithShape="1">
-          <a:blip r:embed="rId13">
+          <a:blip r:embed="rId13" cstate="print">
             <a:lum/>
           </a:blip>
           <a:srcRect/>
@@ -3551,7 +3577,7 @@
             <a:fld id="{03F41C87-7AD9-4845-A077-840E4A0F3F06}" type="datetimeFigureOut">
               <a:rPr lang="en-US" smtClean="0"/>
               <a:pPr/>
-              <a:t>9/19/2017</a:t>
+              <a:t>11/20/2017</a:t>
             </a:fld>
             <a:endParaRPr lang="en-US"/>
           </a:p>
@@ -4019,7 +4045,7 @@
           <a:p>
             <a:r>
               <a:rPr lang="en-GB" dirty="0"/>
-              <a:t>Varun Keshav Kumar</a:t>
+              <a:t>Varun K</a:t>
             </a:r>
           </a:p>
         </p:txBody>
@@ -4337,9 +4363,41 @@
           </a:xfrm>
         </p:spPr>
         <p:txBody>
-          <a:bodyPr/>
+          <a:bodyPr>
+            <a:normAutofit lnSpcReduction="10000"/>
+          </a:bodyPr>
           <a:lstStyle/>
           <a:p>
+            <a:r>
+              <a:rPr lang="en-IN" dirty="0"/>
+              <a:t>An incubation project by the Media Lab Learning  Initiative and Learning Machine that builds an ecosystem for creating, sharing, and verifying</a:t>
+            </a:r>
+            <a:r>
+              <a:rPr lang="en-IN" u="sng" dirty="0"/>
+              <a:t> </a:t>
+            </a:r>
+            <a:r>
+              <a:rPr lang="en-IN" dirty="0"/>
+              <a:t>blockchain-based educational certificates. Digital certificates are registered on the Bitcoin blockchain, cryptographically signed, and tamper proof.</a:t>
+            </a:r>
+          </a:p>
+          <a:p>
+            <a:r>
+              <a:rPr lang="en-IN" dirty="0"/>
+              <a:t> Sony Global Education announced plans for a blockchain service that would allow students to securely transmit data. For instance, they could safely share their exam results with a potential employer.</a:t>
+            </a:r>
+          </a:p>
+          <a:p>
+            <a:r>
+              <a:rPr lang="en-US" dirty="0"/>
+              <a:t>Educoin, which is an education based cryptocurrency. </a:t>
+            </a:r>
+          </a:p>
+          <a:p>
+            <a:r>
+              <a:rPr lang="en-US" dirty="0"/>
+              <a:t>IBM Learning Lab, which is an open source program dealing with certifying education records.</a:t>
+            </a:r>
             <a:endParaRPr lang="en-GB" dirty="0"/>
           </a:p>
         </p:txBody>
@@ -4572,13 +4630,66 @@
               </a:rPr>
               <a:t>to issue and verify blockchain-based official records like civic records, academic credentials, professional licenses.</a:t>
             </a:r>
-            <a:endParaRPr lang="en-GB" sz="2400" cap="none" spc="0" dirty="0">
-              <a:solidFill>
-                <a:prstClr val="white"/>
-              </a:solidFill>
-            </a:endParaRPr>
-          </a:p>
-          <a:p>
+          </a:p>
+          <a:p>
+            <a:pPr marL="223838" lvl="0" indent="-223838">
+              <a:spcBef>
+                <a:spcPts val="1800"/>
+              </a:spcBef>
+              <a:buClr>
+                <a:srgbClr val="56C5FF"/>
+              </a:buClr>
+              <a:buFont typeface="Arial" pitchFamily="34" charset="0"/>
+              <a:buChar char="•"/>
+            </a:pPr>
+            <a:r>
+              <a:rPr lang="en-US" sz="2400" cap="none" spc="0" dirty="0">
+                <a:solidFill>
+                  <a:prstClr val="white"/>
+                </a:solidFill>
+              </a:rPr>
+              <a:t>Digitally accurate records of individual.</a:t>
+            </a:r>
+          </a:p>
+          <a:p>
+            <a:pPr marL="223838" lvl="0" indent="-223838">
+              <a:spcBef>
+                <a:spcPts val="1800"/>
+              </a:spcBef>
+              <a:buClr>
+                <a:srgbClr val="56C5FF"/>
+              </a:buClr>
+              <a:buFont typeface="Arial" pitchFamily="34" charset="0"/>
+              <a:buChar char="•"/>
+            </a:pPr>
+            <a:r>
+              <a:rPr lang="en-US" sz="2400" cap="none" spc="0" dirty="0">
+                <a:solidFill>
+                  <a:prstClr val="white"/>
+                </a:solidFill>
+              </a:rPr>
+              <a:t>Secure and immutable information of the user.</a:t>
+            </a:r>
+          </a:p>
+          <a:p>
+            <a:pPr marL="223838" lvl="0" indent="-223838">
+              <a:spcBef>
+                <a:spcPts val="1800"/>
+              </a:spcBef>
+              <a:buClr>
+                <a:srgbClr val="56C5FF"/>
+              </a:buClr>
+              <a:buFont typeface="Arial" pitchFamily="34" charset="0"/>
+              <a:buChar char="•"/>
+            </a:pPr>
+            <a:r>
+              <a:rPr lang="en-US" sz="2400" cap="none" spc="0" dirty="0">
+                <a:solidFill>
+                  <a:prstClr val="white"/>
+                </a:solidFill>
+              </a:rPr>
+              <a:t>Use the convenience of smart phones for document submission.</a:t>
+            </a:r>
             <a:endParaRPr lang="en-US" dirty="0">
               <a:latin typeface="Times New Roman" panose="02020603050405020304" pitchFamily="18" charset="0"/>
               <a:cs typeface="Times New Roman" panose="02020603050405020304" pitchFamily="18" charset="0"/>

</xml_diff>